<commit_message>
Fix typo in the presentation files
</commit_message>
<xml_diff>
--- a/themenvorstellung/grpc/gRPC.pptx
+++ b/themenvorstellung/grpc/gRPC.pptx
@@ -7059,8 +7059,13 @@
             <a:pPr lvl="1"/>
             <a:r>
               <a:rPr lang="de-DE" dirty="0"/>
-              <a:t>Messages ersetzen Legacy-REST DTOs (und Entitäten)</a:t>
-            </a:r>
+              <a:t>Messages bilden Payload </a:t>
+            </a:r>
+            <a:r>
+              <a:rPr lang="de-DE"/>
+              <a:t>zu übermittelnder Daten</a:t>
+            </a:r>
+            <a:endParaRPr lang="de-DE" dirty="0"/>
           </a:p>
           <a:p>
             <a:pPr lvl="1"/>
@@ -7094,15 +7099,7 @@
             </a:r>
             <a:r>
               <a:rPr lang="de-DE" dirty="0"/>
-              <a:t> </a:t>
-            </a:r>
-            <a:r>
-              <a:rPr lang="de-DE" dirty="0" err="1"/>
-              <a:t>generierung</a:t>
-            </a:r>
-            <a:r>
-              <a:rPr lang="de-DE" dirty="0"/>
-              <a:t> von Schnittstellen</a:t>
+              <a:t> Generierung von Schnittstellen</a:t>
             </a:r>
           </a:p>
           <a:p>

</xml_diff>